<commit_message>
Pdf and ppt created
</commit_message>
<xml_diff>
--- a/TechnoPhilia22_Team2ez4us.pptx
+++ b/TechnoPhilia22_Team2ez4us.pptx
@@ -5298,7 +5298,7 @@
         <p:spPr>
           <a:xfrm>
             <a:off x="717550" y="817880"/>
-            <a:ext cx="3870960" cy="799465"/>
+            <a:ext cx="4754880" cy="799465"/>
           </a:xfrm>
           <a:prstGeom prst="roundRect">
             <a:avLst>
@@ -5345,15 +5345,15 @@
         </p:nvSpPr>
         <p:spPr>
           <a:xfrm>
-            <a:off x="1022073" y="874737"/>
-            <a:ext cx="3261360" cy="706755"/>
+            <a:off x="1389380" y="875030"/>
+            <a:ext cx="4214495" cy="706755"/>
           </a:xfrm>
           <a:prstGeom prst="rect">
             <a:avLst/>
           </a:prstGeom>
         </p:spPr>
         <p:txBody>
-          <a:bodyPr wrap="none">
+          <a:bodyPr wrap="square">
             <a:spAutoFit/>
           </a:bodyPr>
           <a:lstStyle/>

</xml_diff>